<commit_message>
fix reference to module
</commit_message>
<xml_diff>
--- a/LectureFiles/cbw/2015/RNASeq_Module4_Tutorial.pptx
+++ b/LectureFiles/cbw/2015/RNASeq_Module4_Tutorial.pptx
@@ -263,7 +263,7 @@
               <a:pPr>
                 <a:defRPr/>
               </a:pPr>
-              <a:t>6/1/15</a:t>
+              <a:t>6/9/15</a:t>
             </a:fld>
             <a:endParaRPr lang="en-US"/>
           </a:p>
@@ -478,7 +478,7 @@
               <a:pPr>
                 <a:defRPr/>
               </a:pPr>
-              <a:t>6/1/15</a:t>
+              <a:t>6/9/15</a:t>
             </a:fld>
             <a:endParaRPr lang="en-US"/>
           </a:p>
@@ -5884,7 +5884,7 @@
               <a:pPr>
                 <a:defRPr/>
               </a:pPr>
-              <a:t>6/1/15</a:t>
+              <a:t>6/9/15</a:t>
             </a:fld>
             <a:endParaRPr lang="en-US"/>
           </a:p>
@@ -7750,6 +7750,13 @@
   <p:clrMapOvr>
     <a:masterClrMapping/>
   </p:clrMapOvr>
+  <p:timing>
+    <p:tnLst>
+      <p:par>
+        <p:cTn xmlns:p14="http://schemas.microsoft.com/office/powerpoint/2010/main" id="1" dur="indefinite" restart="never" nodeType="tmRoot"/>
+      </p:par>
+    </p:tnLst>
+  </p:timing>
 </p:sld>
 </file>
 
@@ -9106,7 +9113,15 @@
             </a:pPr>
             <a:r>
               <a:rPr lang="en-US" dirty="0" smtClean="0"/>
-              <a:t>In Module 4 we ran cufflinks in ‘ref-only’ mode.  This mode gives us an expression estimate for each known gene/transcript</a:t>
+              <a:t>In Module </a:t>
+            </a:r>
+            <a:r>
+              <a:rPr lang="en-US" dirty="0" smtClean="0"/>
+              <a:t>3 </a:t>
+            </a:r>
+            <a:r>
+              <a:rPr lang="en-US" dirty="0" smtClean="0"/>
+              <a:t>we ran cufflinks in ‘ref-only’ mode.  This mode gives us an expression estimate for each known gene/transcript</a:t>
             </a:r>
           </a:p>
           <a:p>

</xml_diff>